<commit_message>
adding cleaned location type code and updated slides
</commit_message>
<xml_diff>
--- a/Horror_Movie_Trends_Project1_11142022_DT.pptx
+++ b/Horror_Movie_Trends_Project1_11142022_DT.pptx
@@ -815,7 +815,7 @@
           <a:p>
             <a:fld id="{78ABE3C1-DBE1-495D-B57B-2849774B866A}" type="datetimeFigureOut">
               <a:rPr lang="en-US" smtClean="0"/>
-              <a:t>11/7/2022</a:t>
+              <a:t>11/9/2022</a:t>
             </a:fld>
             <a:endParaRPr lang="en-US" dirty="0"/>
           </a:p>
@@ -1976,7 +1976,7 @@
           <a:p>
             <a:fld id="{9D6E9DEC-419B-4CC5-A080-3B06BD5A8291}" type="datetimeFigureOut">
               <a:rPr lang="en-US" smtClean="0"/>
-              <a:t>11/7/2022</a:t>
+              <a:t>11/9/2022</a:t>
             </a:fld>
             <a:endParaRPr lang="en-US" dirty="0"/>
           </a:p>
@@ -3032,7 +3032,7 @@
           <a:p>
             <a:fld id="{9D6E9DEC-419B-4CC5-A080-3B06BD5A8291}" type="datetimeFigureOut">
               <a:rPr lang="en-US" smtClean="0"/>
-              <a:t>11/7/2022</a:t>
+              <a:t>11/9/2022</a:t>
             </a:fld>
             <a:endParaRPr lang="en-US" dirty="0"/>
           </a:p>
@@ -4247,7 +4247,7 @@
           <a:p>
             <a:fld id="{9D6E9DEC-419B-4CC5-A080-3B06BD5A8291}" type="datetimeFigureOut">
               <a:rPr lang="en-US" smtClean="0"/>
-              <a:t>11/7/2022</a:t>
+              <a:t>11/9/2022</a:t>
             </a:fld>
             <a:endParaRPr lang="en-US" dirty="0"/>
           </a:p>
@@ -5353,7 +5353,7 @@
           <a:p>
             <a:fld id="{9D6E9DEC-419B-4CC5-A080-3B06BD5A8291}" type="datetimeFigureOut">
               <a:rPr lang="en-US" smtClean="0"/>
-              <a:t>11/7/2022</a:t>
+              <a:t>11/9/2022</a:t>
             </a:fld>
             <a:endParaRPr lang="en-US" dirty="0"/>
           </a:p>
@@ -6007,7 +6007,7 @@
           <a:p>
             <a:fld id="{9D6E9DEC-419B-4CC5-A080-3B06BD5A8291}" type="datetimeFigureOut">
               <a:rPr lang="en-US" smtClean="0"/>
-              <a:t>11/7/2022</a:t>
+              <a:t>11/9/2022</a:t>
             </a:fld>
             <a:endParaRPr lang="en-US" dirty="0"/>
           </a:p>
@@ -6856,7 +6856,7 @@
           <a:p>
             <a:fld id="{9D6E9DEC-419B-4CC5-A080-3B06BD5A8291}" type="datetimeFigureOut">
               <a:rPr lang="en-US" smtClean="0"/>
-              <a:t>11/7/2022</a:t>
+              <a:t>11/9/2022</a:t>
             </a:fld>
             <a:endParaRPr lang="en-US" dirty="0"/>
           </a:p>
@@ -7043,7 +7043,7 @@
           <a:p>
             <a:fld id="{1FA3F48C-C7C6-4055-9F49-3777875E72AE}" type="datetimeFigureOut">
               <a:rPr lang="en-US" smtClean="0"/>
-              <a:t>11/7/2022</a:t>
+              <a:t>11/9/2022</a:t>
             </a:fld>
             <a:endParaRPr lang="en-US" dirty="0"/>
           </a:p>
@@ -8084,7 +8084,7 @@
           <a:p>
             <a:fld id="{6178E61D-D431-422C-9764-11DAFE33AB63}" type="datetimeFigureOut">
               <a:rPr lang="en-US" smtClean="0"/>
-              <a:t>11/7/2022</a:t>
+              <a:t>11/9/2022</a:t>
             </a:fld>
             <a:endParaRPr lang="en-US" dirty="0"/>
           </a:p>
@@ -8301,7 +8301,7 @@
           <a:p>
             <a:fld id="{12DE42F4-6EEF-4EF7-8ED4-2208F0F89A08}" type="datetimeFigureOut">
               <a:rPr lang="en-US" smtClean="0"/>
-              <a:t>11/7/2022</a:t>
+              <a:t>11/9/2022</a:t>
             </a:fld>
             <a:endParaRPr lang="en-US" dirty="0"/>
           </a:p>
@@ -9406,7 +9406,7 @@
           <a:p>
             <a:fld id="{30578ACC-22D6-47C1-A373-4FD133E34F3C}" type="datetimeFigureOut">
               <a:rPr lang="en-US" smtClean="0"/>
-              <a:t>11/7/2022</a:t>
+              <a:t>11/9/2022</a:t>
             </a:fld>
             <a:endParaRPr lang="en-US" dirty="0"/>
           </a:p>
@@ -9678,7 +9678,7 @@
           <a:p>
             <a:fld id="{4E5A6C69-6797-4E8A-BF37-F2C3751466E9}" type="datetimeFigureOut">
               <a:rPr lang="en-US" smtClean="0"/>
-              <a:t>11/7/2022</a:t>
+              <a:t>11/9/2022</a:t>
             </a:fld>
             <a:endParaRPr lang="en-US" dirty="0"/>
           </a:p>
@@ -10060,7 +10060,7 @@
           <a:p>
             <a:fld id="{D82014A1-A632-4878-A0D3-F52BA7563730}" type="datetimeFigureOut">
               <a:rPr lang="en-US" smtClean="0"/>
-              <a:t>11/7/2022</a:t>
+              <a:t>11/9/2022</a:t>
             </a:fld>
             <a:endParaRPr lang="en-US" dirty="0"/>
           </a:p>
@@ -10178,7 +10178,7 @@
           <a:p>
             <a:fld id="{CE99F462-093F-4566-844B-4C71F2739DA5}" type="datetimeFigureOut">
               <a:rPr lang="en-US" smtClean="0"/>
-              <a:t>11/7/2022</a:t>
+              <a:t>11/9/2022</a:t>
             </a:fld>
             <a:endParaRPr lang="en-US" dirty="0"/>
           </a:p>
@@ -10273,7 +10273,7 @@
           <a:p>
             <a:fld id="{3D24A7AC-904D-4781-85BA-7D10C17ED021}" type="datetimeFigureOut">
               <a:rPr lang="en-US" smtClean="0"/>
-              <a:t>11/7/2022</a:t>
+              <a:t>11/9/2022</a:t>
             </a:fld>
             <a:endParaRPr lang="en-US" dirty="0"/>
           </a:p>
@@ -11425,7 +11425,7 @@
           <a:p>
             <a:fld id="{E331444B-B92B-4E27-8C94-BB93EAF5CB18}" type="datetimeFigureOut">
               <a:rPr lang="en-US" smtClean="0"/>
-              <a:t>11/7/2022</a:t>
+              <a:t>11/9/2022</a:t>
             </a:fld>
             <a:endParaRPr lang="en-US" dirty="0"/>
           </a:p>
@@ -12601,7 +12601,7 @@
           <a:p>
             <a:fld id="{363EFA5E-FA76-400D-B3DC-F0BA90E6D107}" type="datetimeFigureOut">
               <a:rPr lang="en-US" smtClean="0"/>
-              <a:t>11/7/2022</a:t>
+              <a:t>11/9/2022</a:t>
             </a:fld>
             <a:endParaRPr lang="en-US" dirty="0"/>
           </a:p>
@@ -13707,7 +13707,7 @@
           <a:p>
             <a:fld id="{9D6E9DEC-419B-4CC5-A080-3B06BD5A8291}" type="datetimeFigureOut">
               <a:rPr lang="en-US" smtClean="0"/>
-              <a:t>11/7/2022</a:t>
+              <a:t>11/9/2022</a:t>
             </a:fld>
             <a:endParaRPr lang="en-US" dirty="0"/>
           </a:p>
@@ -15738,13 +15738,13 @@
         </p:spPr>
         <p:txBody>
           <a:bodyPr>
-            <a:normAutofit fontScale="62500" lnSpcReduction="20000"/>
+            <a:normAutofit fontScale="55000" lnSpcReduction="20000"/>
           </a:bodyPr>
           <a:lstStyle/>
           <a:p>
             <a:r>
               <a:rPr lang="en-US" dirty="0"/>
-              <a:t>With Halloween passing behind us, it would be interesting to look at the horror genre and its popularity within the data set. Today we are seeing a rise in remakes and sequels that may or may not be cutting it for the viewers and would like to see how previous horror films did with the ratings.</a:t>
+              <a:t>With Halloween just passing while picking our projects our group thought it would be interesting to see how horror movie interest and ratings have trended over the past few years. The first data set we found had horror movies ranging from 2012-2017 but we wanted to expand upon this time frame. This led us to include a Netflix data set allowing us to expand our analysis using the streaming services. Not only was the theme of interest but these data sets were a good introduction for cleaning data sets.</a:t>
             </a:r>
           </a:p>
           <a:p>
@@ -15891,7 +15891,12 @@
             <p:ph type="title"/>
           </p:nvPr>
         </p:nvSpPr>
-        <p:spPr/>
+        <p:spPr>
+          <a:xfrm>
+            <a:off x="1154954" y="947920"/>
+            <a:ext cx="9149106" cy="728480"/>
+          </a:xfrm>
+        </p:spPr>
         <p:txBody>
           <a:bodyPr/>
           <a:lstStyle/>
@@ -15901,7 +15906,7 @@
                 <a:latin typeface="Simplified Arabic Fixed" panose="02070309020205020404" pitchFamily="49" charset="-78"/>
                 <a:cs typeface="Simplified Arabic Fixed" panose="02070309020205020404" pitchFamily="49" charset="-78"/>
               </a:rPr>
-              <a:t>Rating Analysis</a:t>
+              <a:t>Rating Analysis: Source Material</a:t>
             </a:r>
           </a:p>
         </p:txBody>
@@ -15922,7 +15927,12 @@
             <p:ph idx="1"/>
           </p:nvPr>
         </p:nvSpPr>
-        <p:spPr/>
+        <p:spPr>
+          <a:xfrm>
+            <a:off x="1154954" y="2603500"/>
+            <a:ext cx="10372028" cy="3416300"/>
+          </a:xfrm>
+        </p:spPr>
         <p:txBody>
           <a:bodyPr/>
           <a:lstStyle/>
@@ -16086,14 +16096,53 @@
         </p:spPr>
         <p:txBody>
           <a:bodyPr anchor="ctr">
-            <a:normAutofit/>
+            <a:normAutofit fontScale="92500" lnSpcReduction="20000"/>
           </a:bodyPr>
           <a:lstStyle/>
+          <a:p>
+            <a:endParaRPr lang="en-US" dirty="0"/>
+          </a:p>
+          <a:p>
+            <a:endParaRPr lang="en-US" dirty="0"/>
+          </a:p>
+          <a:p>
+            <a:endParaRPr lang="en-US" dirty="0"/>
+          </a:p>
           <a:p>
             <a:r>
               <a:rPr lang="en-US" dirty="0"/>
               <a:t>What is the coloration between review rating and run time?</a:t>
             </a:r>
+          </a:p>
+          <a:p>
+            <a:pPr lvl="1"/>
+            <a:r>
+              <a:rPr lang="en-US" dirty="0"/>
+              <a:t>There is a weak coloration between review rating and movie run time. </a:t>
+            </a:r>
+          </a:p>
+          <a:p>
+            <a:pPr lvl="1"/>
+            <a:r>
+              <a:rPr lang="en-US" dirty="0"/>
+              <a:t>From the r2 value we can also see the data does not fit the line well. </a:t>
+            </a:r>
+          </a:p>
+          <a:p>
+            <a:pPr lvl="1"/>
+            <a:r>
+              <a:rPr lang="en-US" dirty="0"/>
+              <a:t>From the data given we can note the movie run time drops off with a rating above 8. </a:t>
+            </a:r>
+          </a:p>
+          <a:p>
+            <a:endParaRPr lang="en-US" dirty="0"/>
+          </a:p>
+          <a:p>
+            <a:pPr marL="0" indent="0">
+              <a:buNone/>
+            </a:pPr>
+            <a:endParaRPr lang="en-US" dirty="0"/>
           </a:p>
           <a:p>
             <a:pPr lvl="1"/>
@@ -16235,9 +16284,15 @@
         </p:spPr>
         <p:txBody>
           <a:bodyPr anchor="ctr">
-            <a:normAutofit/>
+            <a:normAutofit lnSpcReduction="10000"/>
           </a:bodyPr>
           <a:lstStyle/>
+          <a:p>
+            <a:endParaRPr lang="en-US" dirty="0"/>
+          </a:p>
+          <a:p>
+            <a:endParaRPr lang="en-US" dirty="0"/>
+          </a:p>
           <a:p>
             <a:r>
               <a:rPr lang="en-US" dirty="0"/>
@@ -16245,6 +16300,22 @@
             </a:r>
           </a:p>
           <a:p>
+            <a:pPr lvl="1"/>
+            <a:r>
+              <a:rPr lang="en-US" dirty="0"/>
+              <a:t>From this chart we can determine municipalities and towns tend to have higher ratings but are not significantly ahead.  </a:t>
+            </a:r>
+          </a:p>
+          <a:p>
+            <a:pPr lvl="1"/>
+            <a:r>
+              <a:rPr lang="en-US" dirty="0"/>
+              <a:t>Hamlets on the other hand are not the best setting for </a:t>
+            </a:r>
+            <a:r>
+              <a:rPr lang="en-US"/>
+              <a:t>horror movies</a:t>
+            </a:r>
             <a:endParaRPr lang="en-US" dirty="0"/>
           </a:p>
           <a:p>
@@ -16258,10 +16329,10 @@
       </p:sp>
       <p:pic>
         <p:nvPicPr>
-          <p:cNvPr id="4" name="Picture 3">
+          <p:cNvPr id="6" name="Picture 5">
             <a:extLst>
               <a:ext uri="{FF2B5EF4-FFF2-40B4-BE49-F238E27FC236}">
-                <a16:creationId xmlns:a16="http://schemas.microsoft.com/office/drawing/2014/main" id="{E5B22AA0-1FE4-61BC-6C69-D8BE292DDF10}"/>
+                <a16:creationId xmlns:a16="http://schemas.microsoft.com/office/drawing/2014/main" id="{F0CAAF1C-CB2C-BAD0-6D2D-1AF37EE85E21}"/>
               </a:ext>
             </a:extLst>
           </p:cNvPr>
@@ -16278,8 +16349,8 @@
         </p:blipFill>
         <p:spPr>
           <a:xfrm>
-            <a:off x="6917546" y="2603500"/>
-            <a:ext cx="4562247" cy="3963581"/>
+            <a:off x="6578853" y="2414538"/>
+            <a:ext cx="4257706" cy="3533801"/>
           </a:xfrm>
           <a:prstGeom prst="rect">
             <a:avLst/>

</xml_diff>

<commit_message>
editted wording and compiled slide deck
</commit_message>
<xml_diff>
--- a/Horror_Movie_Trends_Project1_11142022_DT.pptx
+++ b/Horror_Movie_Trends_Project1_11142022_DT.pptx
@@ -815,7 +815,7 @@
           <a:p>
             <a:fld id="{78ABE3C1-DBE1-495D-B57B-2849774B866A}" type="datetimeFigureOut">
               <a:rPr lang="en-US" smtClean="0"/>
-              <a:t>11/9/2022</a:t>
+              <a:t>11/10/2022</a:t>
             </a:fld>
             <a:endParaRPr lang="en-US" dirty="0"/>
           </a:p>
@@ -1976,7 +1976,7 @@
           <a:p>
             <a:fld id="{9D6E9DEC-419B-4CC5-A080-3B06BD5A8291}" type="datetimeFigureOut">
               <a:rPr lang="en-US" smtClean="0"/>
-              <a:t>11/9/2022</a:t>
+              <a:t>11/10/2022</a:t>
             </a:fld>
             <a:endParaRPr lang="en-US" dirty="0"/>
           </a:p>
@@ -3032,7 +3032,7 @@
           <a:p>
             <a:fld id="{9D6E9DEC-419B-4CC5-A080-3B06BD5A8291}" type="datetimeFigureOut">
               <a:rPr lang="en-US" smtClean="0"/>
-              <a:t>11/9/2022</a:t>
+              <a:t>11/10/2022</a:t>
             </a:fld>
             <a:endParaRPr lang="en-US" dirty="0"/>
           </a:p>
@@ -4247,7 +4247,7 @@
           <a:p>
             <a:fld id="{9D6E9DEC-419B-4CC5-A080-3B06BD5A8291}" type="datetimeFigureOut">
               <a:rPr lang="en-US" smtClean="0"/>
-              <a:t>11/9/2022</a:t>
+              <a:t>11/10/2022</a:t>
             </a:fld>
             <a:endParaRPr lang="en-US" dirty="0"/>
           </a:p>
@@ -5353,7 +5353,7 @@
           <a:p>
             <a:fld id="{9D6E9DEC-419B-4CC5-A080-3B06BD5A8291}" type="datetimeFigureOut">
               <a:rPr lang="en-US" smtClean="0"/>
-              <a:t>11/9/2022</a:t>
+              <a:t>11/10/2022</a:t>
             </a:fld>
             <a:endParaRPr lang="en-US" dirty="0"/>
           </a:p>
@@ -6007,7 +6007,7 @@
           <a:p>
             <a:fld id="{9D6E9DEC-419B-4CC5-A080-3B06BD5A8291}" type="datetimeFigureOut">
               <a:rPr lang="en-US" smtClean="0"/>
-              <a:t>11/9/2022</a:t>
+              <a:t>11/10/2022</a:t>
             </a:fld>
             <a:endParaRPr lang="en-US" dirty="0"/>
           </a:p>
@@ -6856,7 +6856,7 @@
           <a:p>
             <a:fld id="{9D6E9DEC-419B-4CC5-A080-3B06BD5A8291}" type="datetimeFigureOut">
               <a:rPr lang="en-US" smtClean="0"/>
-              <a:t>11/9/2022</a:t>
+              <a:t>11/10/2022</a:t>
             </a:fld>
             <a:endParaRPr lang="en-US" dirty="0"/>
           </a:p>
@@ -7043,7 +7043,7 @@
           <a:p>
             <a:fld id="{1FA3F48C-C7C6-4055-9F49-3777875E72AE}" type="datetimeFigureOut">
               <a:rPr lang="en-US" smtClean="0"/>
-              <a:t>11/9/2022</a:t>
+              <a:t>11/10/2022</a:t>
             </a:fld>
             <a:endParaRPr lang="en-US" dirty="0"/>
           </a:p>
@@ -8084,7 +8084,7 @@
           <a:p>
             <a:fld id="{6178E61D-D431-422C-9764-11DAFE33AB63}" type="datetimeFigureOut">
               <a:rPr lang="en-US" smtClean="0"/>
-              <a:t>11/9/2022</a:t>
+              <a:t>11/10/2022</a:t>
             </a:fld>
             <a:endParaRPr lang="en-US" dirty="0"/>
           </a:p>
@@ -8301,7 +8301,7 @@
           <a:p>
             <a:fld id="{12DE42F4-6EEF-4EF7-8ED4-2208F0F89A08}" type="datetimeFigureOut">
               <a:rPr lang="en-US" smtClean="0"/>
-              <a:t>11/9/2022</a:t>
+              <a:t>11/10/2022</a:t>
             </a:fld>
             <a:endParaRPr lang="en-US" dirty="0"/>
           </a:p>
@@ -9406,7 +9406,7 @@
           <a:p>
             <a:fld id="{30578ACC-22D6-47C1-A373-4FD133E34F3C}" type="datetimeFigureOut">
               <a:rPr lang="en-US" smtClean="0"/>
-              <a:t>11/9/2022</a:t>
+              <a:t>11/10/2022</a:t>
             </a:fld>
             <a:endParaRPr lang="en-US" dirty="0"/>
           </a:p>
@@ -9678,7 +9678,7 @@
           <a:p>
             <a:fld id="{4E5A6C69-6797-4E8A-BF37-F2C3751466E9}" type="datetimeFigureOut">
               <a:rPr lang="en-US" smtClean="0"/>
-              <a:t>11/9/2022</a:t>
+              <a:t>11/10/2022</a:t>
             </a:fld>
             <a:endParaRPr lang="en-US" dirty="0"/>
           </a:p>
@@ -10060,7 +10060,7 @@
           <a:p>
             <a:fld id="{D82014A1-A632-4878-A0D3-F52BA7563730}" type="datetimeFigureOut">
               <a:rPr lang="en-US" smtClean="0"/>
-              <a:t>11/9/2022</a:t>
+              <a:t>11/10/2022</a:t>
             </a:fld>
             <a:endParaRPr lang="en-US" dirty="0"/>
           </a:p>
@@ -10178,7 +10178,7 @@
           <a:p>
             <a:fld id="{CE99F462-093F-4566-844B-4C71F2739DA5}" type="datetimeFigureOut">
               <a:rPr lang="en-US" smtClean="0"/>
-              <a:t>11/9/2022</a:t>
+              <a:t>11/10/2022</a:t>
             </a:fld>
             <a:endParaRPr lang="en-US" dirty="0"/>
           </a:p>
@@ -10273,7 +10273,7 @@
           <a:p>
             <a:fld id="{3D24A7AC-904D-4781-85BA-7D10C17ED021}" type="datetimeFigureOut">
               <a:rPr lang="en-US" smtClean="0"/>
-              <a:t>11/9/2022</a:t>
+              <a:t>11/10/2022</a:t>
             </a:fld>
             <a:endParaRPr lang="en-US" dirty="0"/>
           </a:p>
@@ -11425,7 +11425,7 @@
           <a:p>
             <a:fld id="{E331444B-B92B-4E27-8C94-BB93EAF5CB18}" type="datetimeFigureOut">
               <a:rPr lang="en-US" smtClean="0"/>
-              <a:t>11/9/2022</a:t>
+              <a:t>11/10/2022</a:t>
             </a:fld>
             <a:endParaRPr lang="en-US" dirty="0"/>
           </a:p>
@@ -12601,7 +12601,7 @@
           <a:p>
             <a:fld id="{363EFA5E-FA76-400D-B3DC-F0BA90E6D107}" type="datetimeFigureOut">
               <a:rPr lang="en-US" smtClean="0"/>
-              <a:t>11/9/2022</a:t>
+              <a:t>11/10/2022</a:t>
             </a:fld>
             <a:endParaRPr lang="en-US" dirty="0"/>
           </a:p>
@@ -13707,7 +13707,7 @@
           <a:p>
             <a:fld id="{9D6E9DEC-419B-4CC5-A080-3B06BD5A8291}" type="datetimeFigureOut">
               <a:rPr lang="en-US" smtClean="0"/>
-              <a:t>11/9/2022</a:t>
+              <a:t>11/10/2022</a:t>
             </a:fld>
             <a:endParaRPr lang="en-US" dirty="0"/>
           </a:p>
@@ -15827,7 +15827,7 @@
             <a:pPr lvl="2"/>
             <a:r>
               <a:rPr lang="en-US" dirty="0"/>
-              <a:t>Number of horror movie release vs total release per county per year?</a:t>
+              <a:t>Number of horror movie release vs total release per year?</a:t>
             </a:r>
           </a:p>
           <a:p>

</xml_diff>